<commit_message>
Google Play Resources added
</commit_message>
<xml_diff>
--- a/MyResources/Photos/Photos.pptx
+++ b/MyResources/Photos/Photos.pptx
@@ -295,7 +295,7 @@
             <a:fld id="{9BD460DB-1E1D-4D0B-AD29-6FB14D7FA551}" type="datetimeFigureOut">
               <a:rPr lang="en-US" smtClean="0"/>
               <a:pPr/>
-              <a:t>3/23/2014</a:t>
+              <a:t>1/10/2015</a:t>
             </a:fld>
             <a:endParaRPr lang="en-GB"/>
           </a:p>
@@ -462,7 +462,7 @@
             <a:fld id="{9BD460DB-1E1D-4D0B-AD29-6FB14D7FA551}" type="datetimeFigureOut">
               <a:rPr lang="en-US" smtClean="0"/>
               <a:pPr/>
-              <a:t>3/23/2014</a:t>
+              <a:t>1/10/2015</a:t>
             </a:fld>
             <a:endParaRPr lang="en-GB"/>
           </a:p>
@@ -639,7 +639,7 @@
             <a:fld id="{9BD460DB-1E1D-4D0B-AD29-6FB14D7FA551}" type="datetimeFigureOut">
               <a:rPr lang="en-US" smtClean="0"/>
               <a:pPr/>
-              <a:t>3/23/2014</a:t>
+              <a:t>1/10/2015</a:t>
             </a:fld>
             <a:endParaRPr lang="en-GB"/>
           </a:p>
@@ -806,7 +806,7 @@
             <a:fld id="{9BD460DB-1E1D-4D0B-AD29-6FB14D7FA551}" type="datetimeFigureOut">
               <a:rPr lang="en-US" smtClean="0"/>
               <a:pPr/>
-              <a:t>3/23/2014</a:t>
+              <a:t>1/10/2015</a:t>
             </a:fld>
             <a:endParaRPr lang="en-GB"/>
           </a:p>
@@ -1049,7 +1049,7 @@
             <a:fld id="{9BD460DB-1E1D-4D0B-AD29-6FB14D7FA551}" type="datetimeFigureOut">
               <a:rPr lang="en-US" smtClean="0"/>
               <a:pPr/>
-              <a:t>3/23/2014</a:t>
+              <a:t>1/10/2015</a:t>
             </a:fld>
             <a:endParaRPr lang="en-GB"/>
           </a:p>
@@ -1334,7 +1334,7 @@
             <a:fld id="{9BD460DB-1E1D-4D0B-AD29-6FB14D7FA551}" type="datetimeFigureOut">
               <a:rPr lang="en-US" smtClean="0"/>
               <a:pPr/>
-              <a:t>3/23/2014</a:t>
+              <a:t>1/10/2015</a:t>
             </a:fld>
             <a:endParaRPr lang="en-GB"/>
           </a:p>
@@ -1753,7 +1753,7 @@
             <a:fld id="{9BD460DB-1E1D-4D0B-AD29-6FB14D7FA551}" type="datetimeFigureOut">
               <a:rPr lang="en-US" smtClean="0"/>
               <a:pPr/>
-              <a:t>3/23/2014</a:t>
+              <a:t>1/10/2015</a:t>
             </a:fld>
             <a:endParaRPr lang="en-GB"/>
           </a:p>
@@ -1868,7 +1868,7 @@
             <a:fld id="{9BD460DB-1E1D-4D0B-AD29-6FB14D7FA551}" type="datetimeFigureOut">
               <a:rPr lang="en-US" smtClean="0"/>
               <a:pPr/>
-              <a:t>3/23/2014</a:t>
+              <a:t>1/10/2015</a:t>
             </a:fld>
             <a:endParaRPr lang="en-GB"/>
           </a:p>
@@ -1960,7 +1960,7 @@
             <a:fld id="{9BD460DB-1E1D-4D0B-AD29-6FB14D7FA551}" type="datetimeFigureOut">
               <a:rPr lang="en-US" smtClean="0"/>
               <a:pPr/>
-              <a:t>3/23/2014</a:t>
+              <a:t>1/10/2015</a:t>
             </a:fld>
             <a:endParaRPr lang="en-GB"/>
           </a:p>
@@ -2234,7 +2234,7 @@
             <a:fld id="{9BD460DB-1E1D-4D0B-AD29-6FB14D7FA551}" type="datetimeFigureOut">
               <a:rPr lang="en-US" smtClean="0"/>
               <a:pPr/>
-              <a:t>3/23/2014</a:t>
+              <a:t>1/10/2015</a:t>
             </a:fld>
             <a:endParaRPr lang="en-GB"/>
           </a:p>
@@ -2484,7 +2484,7 @@
             <a:fld id="{9BD460DB-1E1D-4D0B-AD29-6FB14D7FA551}" type="datetimeFigureOut">
               <a:rPr lang="en-US" smtClean="0"/>
               <a:pPr/>
-              <a:t>3/23/2014</a:t>
+              <a:t>1/10/2015</a:t>
             </a:fld>
             <a:endParaRPr lang="en-GB"/>
           </a:p>
@@ -2694,7 +2694,7 @@
             <a:fld id="{9BD460DB-1E1D-4D0B-AD29-6FB14D7FA551}" type="datetimeFigureOut">
               <a:rPr lang="en-US" smtClean="0"/>
               <a:pPr/>
-              <a:t>3/23/2014</a:t>
+              <a:t>1/10/2015</a:t>
             </a:fld>
             <a:endParaRPr lang="en-GB"/>
           </a:p>
@@ -3065,11 +3065,378 @@
           <a:chExt cx="0" cy="0"/>
         </a:xfrm>
       </p:grpSpPr>
+      <p:sp>
+        <p:nvSpPr>
+          <p:cNvPr id="2" name="Rectangle 1"/>
+          <p:cNvSpPr/>
+          <p:nvPr/>
+        </p:nvSpPr>
+        <p:spPr>
+          <a:xfrm>
+            <a:off x="3000365" y="2143116"/>
+            <a:ext cx="2643205" cy="1754326"/>
+          </a:xfrm>
+          <a:prstGeom prst="rect">
+            <a:avLst/>
+          </a:prstGeom>
+          <a:noFill/>
+        </p:spPr>
+        <p:txBody>
+          <a:bodyPr wrap="square" lIns="91440" tIns="45720" rIns="91440" bIns="45720">
+            <a:spAutoFit/>
+          </a:bodyPr>
+          <a:lstStyle/>
+          <a:p>
+            <a:r>
+              <a:rPr lang="en-US" sz="5400" b="1" dirty="0" err="1" smtClean="0">
+                <a:ln w="24500" cmpd="dbl">
+                  <a:solidFill>
+                    <a:schemeClr val="accent2">
+                      <a:shade val="85000"/>
+                      <a:satMod val="155000"/>
+                    </a:schemeClr>
+                  </a:solidFill>
+                  <a:prstDash val="solid"/>
+                  <a:miter lim="800000"/>
+                </a:ln>
+                <a:gradFill>
+                  <a:gsLst>
+                    <a:gs pos="10000">
+                      <a:schemeClr val="accent2">
+                        <a:tint val="10000"/>
+                        <a:satMod val="155000"/>
+                      </a:schemeClr>
+                    </a:gs>
+                    <a:gs pos="60000">
+                      <a:schemeClr val="accent2">
+                        <a:tint val="30000"/>
+                        <a:satMod val="155000"/>
+                      </a:schemeClr>
+                    </a:gs>
+                    <a:gs pos="100000">
+                      <a:schemeClr val="accent2">
+                        <a:tint val="73000"/>
+                        <a:satMod val="155000"/>
+                      </a:schemeClr>
+                    </a:gs>
+                  </a:gsLst>
+                  <a:lin ang="5400000"/>
+                </a:gradFill>
+                <a:effectLst>
+                  <a:outerShdw blurRad="38100" dist="38100" dir="7020000" algn="tl">
+                    <a:srgbClr val="000000">
+                      <a:alpha val="35000"/>
+                    </a:srgbClr>
+                  </a:outerShdw>
+                </a:effectLst>
+              </a:rPr>
+              <a:t>u</a:t>
+            </a:r>
+            <a:r>
+              <a:rPr lang="en-US" sz="5400" b="1" cap="none" spc="0" dirty="0" err="1" smtClean="0">
+                <a:ln w="24500" cmpd="dbl">
+                  <a:solidFill>
+                    <a:schemeClr val="accent2">
+                      <a:shade val="85000"/>
+                      <a:satMod val="155000"/>
+                    </a:schemeClr>
+                  </a:solidFill>
+                  <a:prstDash val="solid"/>
+                  <a:miter lim="800000"/>
+                </a:ln>
+                <a:gradFill>
+                  <a:gsLst>
+                    <a:gs pos="10000">
+                      <a:schemeClr val="accent2">
+                        <a:tint val="10000"/>
+                        <a:satMod val="155000"/>
+                      </a:schemeClr>
+                    </a:gs>
+                    <a:gs pos="60000">
+                      <a:schemeClr val="accent2">
+                        <a:tint val="30000"/>
+                        <a:satMod val="155000"/>
+                      </a:schemeClr>
+                    </a:gs>
+                    <a:gs pos="100000">
+                      <a:schemeClr val="accent2">
+                        <a:tint val="73000"/>
+                        <a:satMod val="155000"/>
+                      </a:schemeClr>
+                    </a:gs>
+                  </a:gsLst>
+                  <a:lin ang="5400000"/>
+                </a:gradFill>
+                <a:effectLst>
+                  <a:outerShdw blurRad="38100" dist="38100" dir="7020000" algn="tl">
+                    <a:srgbClr val="000000">
+                      <a:alpha val="35000"/>
+                    </a:srgbClr>
+                  </a:outerShdw>
+                </a:effectLst>
+              </a:rPr>
+              <a:t>stomer</a:t>
+            </a:r>
+            <a:r>
+              <a:rPr lang="en-US" sz="5400" b="1" cap="none" spc="0" dirty="0" smtClean="0">
+                <a:ln w="24500" cmpd="dbl">
+                  <a:solidFill>
+                    <a:schemeClr val="accent2">
+                      <a:shade val="85000"/>
+                      <a:satMod val="155000"/>
+                    </a:schemeClr>
+                  </a:solidFill>
+                  <a:prstDash val="solid"/>
+                  <a:miter lim="800000"/>
+                </a:ln>
+                <a:gradFill>
+                  <a:gsLst>
+                    <a:gs pos="10000">
+                      <a:schemeClr val="accent2">
+                        <a:tint val="10000"/>
+                        <a:satMod val="155000"/>
+                      </a:schemeClr>
+                    </a:gs>
+                    <a:gs pos="60000">
+                      <a:schemeClr val="accent2">
+                        <a:tint val="30000"/>
+                        <a:satMod val="155000"/>
+                      </a:schemeClr>
+                    </a:gs>
+                    <a:gs pos="100000">
+                      <a:schemeClr val="accent2">
+                        <a:tint val="73000"/>
+                        <a:satMod val="155000"/>
+                      </a:schemeClr>
+                    </a:gs>
+                  </a:gsLst>
+                  <a:lin ang="5400000"/>
+                </a:gradFill>
+                <a:effectLst>
+                  <a:outerShdw blurRad="38100" dist="38100" dir="7020000" algn="tl">
+                    <a:srgbClr val="000000">
+                      <a:alpha val="35000"/>
+                    </a:srgbClr>
+                  </a:outerShdw>
+                </a:effectLst>
+              </a:rPr>
+              <a:t> </a:t>
+            </a:r>
+            <a:r>
+              <a:rPr lang="en-US" sz="5400" b="1" dirty="0" smtClean="0">
+                <a:ln w="24500" cmpd="dbl">
+                  <a:solidFill>
+                    <a:schemeClr val="accent2">
+                      <a:shade val="85000"/>
+                      <a:satMod val="155000"/>
+                    </a:schemeClr>
+                  </a:solidFill>
+                  <a:prstDash val="solid"/>
+                  <a:miter lim="800000"/>
+                </a:ln>
+                <a:gradFill>
+                  <a:gsLst>
+                    <a:gs pos="10000">
+                      <a:schemeClr val="accent2">
+                        <a:tint val="10000"/>
+                        <a:satMod val="155000"/>
+                      </a:schemeClr>
+                    </a:gs>
+                    <a:gs pos="60000">
+                      <a:schemeClr val="accent2">
+                        <a:tint val="30000"/>
+                        <a:satMod val="155000"/>
+                      </a:schemeClr>
+                    </a:gs>
+                    <a:gs pos="100000">
+                      <a:schemeClr val="accent2">
+                        <a:tint val="73000"/>
+                        <a:satMod val="155000"/>
+                      </a:schemeClr>
+                    </a:gs>
+                  </a:gsLst>
+                  <a:lin ang="5400000"/>
+                </a:gradFill>
+                <a:effectLst>
+                  <a:outerShdw blurRad="38100" dist="38100" dir="7020000" algn="tl">
+                    <a:srgbClr val="000000">
+                      <a:alpha val="35000"/>
+                    </a:srgbClr>
+                  </a:outerShdw>
+                </a:effectLst>
+              </a:rPr>
+              <a:t>are         </a:t>
+            </a:r>
+            <a:endParaRPr lang="en-US" sz="5400" b="1" cap="none" spc="0" dirty="0">
+              <a:ln w="24500" cmpd="dbl">
+                <a:solidFill>
+                  <a:schemeClr val="accent2">
+                    <a:shade val="85000"/>
+                    <a:satMod val="155000"/>
+                  </a:schemeClr>
+                </a:solidFill>
+                <a:prstDash val="solid"/>
+                <a:miter lim="800000"/>
+              </a:ln>
+              <a:gradFill>
+                <a:gsLst>
+                  <a:gs pos="10000">
+                    <a:schemeClr val="accent2">
+                      <a:tint val="10000"/>
+                      <a:satMod val="155000"/>
+                    </a:schemeClr>
+                  </a:gs>
+                  <a:gs pos="60000">
+                    <a:schemeClr val="accent2">
+                      <a:tint val="30000"/>
+                      <a:satMod val="155000"/>
+                    </a:schemeClr>
+                  </a:gs>
+                  <a:gs pos="100000">
+                    <a:schemeClr val="accent2">
+                      <a:tint val="73000"/>
+                      <a:satMod val="155000"/>
+                    </a:schemeClr>
+                  </a:gs>
+                </a:gsLst>
+                <a:lin ang="5400000"/>
+              </a:gradFill>
+              <a:effectLst>
+                <a:outerShdw blurRad="38100" dist="38100" dir="7020000" algn="tl">
+                  <a:srgbClr val="000000">
+                    <a:alpha val="35000"/>
+                  </a:srgbClr>
+                </a:outerShdw>
+              </a:effectLst>
+            </a:endParaRPr>
+          </a:p>
+        </p:txBody>
+      </p:sp>
+      <p:sp>
+        <p:nvSpPr>
+          <p:cNvPr id="3" name="Rectangle 2"/>
+          <p:cNvSpPr/>
+          <p:nvPr/>
+        </p:nvSpPr>
+        <p:spPr>
+          <a:xfrm>
+            <a:off x="1857356" y="1643050"/>
+            <a:ext cx="1380496" cy="2785378"/>
+          </a:xfrm>
+          <a:prstGeom prst="rect">
+            <a:avLst/>
+          </a:prstGeom>
+          <a:noFill/>
+        </p:spPr>
+        <p:txBody>
+          <a:bodyPr wrap="square" lIns="91440" tIns="45720" rIns="91440" bIns="45720">
+            <a:spAutoFit/>
+          </a:bodyPr>
+          <a:lstStyle/>
+          <a:p>
+            <a:pPr algn="ctr"/>
+            <a:r>
+              <a:rPr lang="en-US" sz="17500" b="1" cap="none" spc="0" dirty="0" smtClean="0">
+                <a:ln w="24500" cmpd="dbl">
+                  <a:solidFill>
+                    <a:schemeClr val="accent2">
+                      <a:shade val="85000"/>
+                      <a:satMod val="155000"/>
+                    </a:schemeClr>
+                  </a:solidFill>
+                  <a:prstDash val="solid"/>
+                  <a:miter lim="800000"/>
+                </a:ln>
+                <a:gradFill>
+                  <a:gsLst>
+                    <a:gs pos="10000">
+                      <a:schemeClr val="accent2">
+                        <a:tint val="10000"/>
+                        <a:satMod val="155000"/>
+                      </a:schemeClr>
+                    </a:gs>
+                    <a:gs pos="60000">
+                      <a:schemeClr val="accent2">
+                        <a:tint val="30000"/>
+                        <a:satMod val="155000"/>
+                      </a:schemeClr>
+                    </a:gs>
+                    <a:gs pos="100000">
+                      <a:schemeClr val="accent2">
+                        <a:tint val="73000"/>
+                        <a:satMod val="155000"/>
+                      </a:schemeClr>
+                    </a:gs>
+                  </a:gsLst>
+                  <a:lin ang="5400000"/>
+                </a:gradFill>
+                <a:effectLst>
+                  <a:outerShdw blurRad="38100" dist="38100" dir="7020000" algn="tl">
+                    <a:srgbClr val="000000">
+                      <a:alpha val="35000"/>
+                    </a:srgbClr>
+                  </a:outerShdw>
+                </a:effectLst>
+              </a:rPr>
+              <a:t>C</a:t>
+            </a:r>
+            <a:endParaRPr lang="en-US" sz="17500" b="1" cap="none" spc="0" dirty="0">
+              <a:ln w="24500" cmpd="dbl">
+                <a:solidFill>
+                  <a:schemeClr val="accent2">
+                    <a:shade val="85000"/>
+                    <a:satMod val="155000"/>
+                  </a:schemeClr>
+                </a:solidFill>
+                <a:prstDash val="solid"/>
+                <a:miter lim="800000"/>
+              </a:ln>
+              <a:gradFill>
+                <a:gsLst>
+                  <a:gs pos="10000">
+                    <a:schemeClr val="accent2">
+                      <a:tint val="10000"/>
+                      <a:satMod val="155000"/>
+                    </a:schemeClr>
+                  </a:gs>
+                  <a:gs pos="60000">
+                    <a:schemeClr val="accent2">
+                      <a:tint val="30000"/>
+                      <a:satMod val="155000"/>
+                    </a:schemeClr>
+                  </a:gs>
+                  <a:gs pos="100000">
+                    <a:schemeClr val="accent2">
+                      <a:tint val="73000"/>
+                      <a:satMod val="155000"/>
+                    </a:schemeClr>
+                  </a:gs>
+                </a:gsLst>
+                <a:lin ang="5400000"/>
+              </a:gradFill>
+              <a:effectLst>
+                <a:outerShdw blurRad="38100" dist="38100" dir="7020000" algn="tl">
+                  <a:srgbClr val="000000">
+                    <a:alpha val="35000"/>
+                  </a:srgbClr>
+                </a:outerShdw>
+              </a:effectLst>
+            </a:endParaRPr>
+          </a:p>
+        </p:txBody>
+      </p:sp>
     </p:spTree>
   </p:cSld>
   <p:clrMapOvr>
     <a:masterClrMapping/>
   </p:clrMapOvr>
+  <p:timing>
+    <p:tnLst>
+      <p:par>
+        <p:cTn id="1" dur="indefinite" restart="never" nodeType="tmRoot"/>
+      </p:par>
+    </p:tnLst>
+  </p:timing>
 </p:sld>
 </file>
 

</xml_diff>